<commit_message>
improvements on the readme document
</commit_message>
<xml_diff>
--- a/test/SBML2PLAS.pptx
+++ b/test/SBML2PLAS.pptx
@@ -104,6 +104,11 @@
       </a:defRPr>
     </a:lvl9pPr>
   </p:defaultTextStyle>
+  <p:extLst>
+    <p:ext uri="{EFAFB233-063F-42B5-8137-9DF3F51BA10A}">
+      <p15:sldGuideLst xmlns:p15="http://schemas.microsoft.com/office/powerpoint/2012/main"/>
+    </p:ext>
+  </p:extLst>
 </p:presentation>
 </file>
 
@@ -2964,576 +2969,886 @@
           <a:chExt cx="0" cy="0"/>
         </a:xfrm>
       </p:grpSpPr>
-      <p:sp>
-        <p:nvSpPr>
-          <p:cNvPr id="4" name="Oval 3"/>
-          <p:cNvSpPr/>
+      <p:grpSp>
+        <p:nvGrpSpPr>
+          <p:cNvPr id="22" name="Group 21"/>
+          <p:cNvGrpSpPr/>
           <p:nvPr/>
-        </p:nvSpPr>
-        <p:spPr>
+        </p:nvGrpSpPr>
+        <p:grpSpPr>
           <a:xfrm>
-            <a:off x="113327" y="1335627"/>
-            <a:ext cx="745958" cy="745958"/>
+            <a:off x="1326665" y="1180409"/>
+            <a:ext cx="6618335" cy="4759059"/>
+            <a:chOff x="1326665" y="1180409"/>
+            <a:chExt cx="6618335" cy="4759059"/>
           </a:xfrm>
-          <a:prstGeom prst="ellipse">
-            <a:avLst/>
-          </a:prstGeom>
-        </p:spPr>
-        <p:style>
-          <a:lnRef idx="0">
-            <a:schemeClr val="accent6"/>
-          </a:lnRef>
-          <a:fillRef idx="3">
-            <a:schemeClr val="accent6"/>
-          </a:fillRef>
-          <a:effectRef idx="3">
-            <a:schemeClr val="accent6"/>
-          </a:effectRef>
-          <a:fontRef idx="minor">
-            <a:schemeClr val="lt1"/>
-          </a:fontRef>
-        </p:style>
-        <p:txBody>
-          <a:bodyPr rtlCol="0" anchor="ctr"/>
-          <a:lstStyle/>
-          <a:p>
-            <a:pPr algn="ctr"/>
-            <a:r>
-              <a:rPr lang="en-US" dirty="0" smtClean="0"/>
-              <a:t>A</a:t>
-            </a:r>
-            <a:endParaRPr lang="en-US" dirty="0"/>
-          </a:p>
-        </p:txBody>
-      </p:sp>
-      <p:sp>
-        <p:nvSpPr>
-          <p:cNvPr id="5" name="Oval 4"/>
-          <p:cNvSpPr/>
-          <p:nvPr/>
-        </p:nvSpPr>
-        <p:spPr>
-          <a:xfrm>
-            <a:off x="2569774" y="1377742"/>
-            <a:ext cx="745958" cy="745958"/>
-          </a:xfrm>
-          <a:prstGeom prst="ellipse">
-            <a:avLst/>
-          </a:prstGeom>
-        </p:spPr>
-        <p:style>
-          <a:lnRef idx="0">
-            <a:schemeClr val="accent6"/>
-          </a:lnRef>
-          <a:fillRef idx="3">
-            <a:schemeClr val="accent6"/>
-          </a:fillRef>
-          <a:effectRef idx="3">
-            <a:schemeClr val="accent6"/>
-          </a:effectRef>
-          <a:fontRef idx="minor">
-            <a:schemeClr val="lt1"/>
-          </a:fontRef>
-        </p:style>
-        <p:txBody>
-          <a:bodyPr rtlCol="0" anchor="ctr"/>
-          <a:lstStyle/>
-          <a:p>
-            <a:pPr algn="ctr"/>
-            <a:r>
-              <a:rPr lang="en-US" dirty="0" smtClean="0"/>
-              <a:t>B</a:t>
-            </a:r>
-            <a:endParaRPr lang="en-US" dirty="0"/>
-          </a:p>
-        </p:txBody>
-      </p:sp>
-      <p:sp>
-        <p:nvSpPr>
-          <p:cNvPr id="6" name="Oval 5"/>
-          <p:cNvSpPr/>
-          <p:nvPr/>
-        </p:nvSpPr>
-        <p:spPr>
-          <a:xfrm>
-            <a:off x="5778195" y="1419850"/>
-            <a:ext cx="745958" cy="745958"/>
-          </a:xfrm>
-          <a:prstGeom prst="ellipse">
-            <a:avLst/>
-          </a:prstGeom>
-        </p:spPr>
-        <p:style>
-          <a:lnRef idx="0">
-            <a:schemeClr val="accent6"/>
-          </a:lnRef>
-          <a:fillRef idx="3">
-            <a:schemeClr val="accent6"/>
-          </a:fillRef>
-          <a:effectRef idx="3">
-            <a:schemeClr val="accent6"/>
-          </a:effectRef>
-          <a:fontRef idx="minor">
-            <a:schemeClr val="lt1"/>
-          </a:fontRef>
-        </p:style>
-        <p:txBody>
-          <a:bodyPr rtlCol="0" anchor="ctr"/>
-          <a:lstStyle/>
-          <a:p>
-            <a:pPr algn="ctr"/>
-            <a:r>
-              <a:rPr lang="en-US" dirty="0" smtClean="0"/>
-              <a:t>C</a:t>
-            </a:r>
-            <a:endParaRPr lang="en-US" dirty="0"/>
-          </a:p>
-        </p:txBody>
-      </p:sp>
-      <p:sp>
-        <p:nvSpPr>
-          <p:cNvPr id="9" name="Right Arrow 8"/>
-          <p:cNvSpPr/>
-          <p:nvPr/>
-        </p:nvSpPr>
-        <p:spPr>
-          <a:xfrm>
-            <a:off x="3686707" y="1552197"/>
-            <a:ext cx="1832810" cy="481264"/>
-          </a:xfrm>
-          <a:prstGeom prst="rightArrow">
-            <a:avLst/>
-          </a:prstGeom>
-        </p:spPr>
-        <p:style>
-          <a:lnRef idx="0">
-            <a:schemeClr val="accent5"/>
-          </a:lnRef>
-          <a:fillRef idx="3">
-            <a:schemeClr val="accent5"/>
-          </a:fillRef>
-          <a:effectRef idx="3">
-            <a:schemeClr val="accent5"/>
-          </a:effectRef>
-          <a:fontRef idx="minor">
-            <a:schemeClr val="lt1"/>
-          </a:fontRef>
-        </p:style>
-        <p:txBody>
-          <a:bodyPr rtlCol="0" anchor="ctr"/>
-          <a:lstStyle/>
-          <a:p>
-            <a:pPr algn="ctr"/>
-            <a:endParaRPr lang="en-US"/>
-          </a:p>
-        </p:txBody>
-      </p:sp>
-      <p:sp>
-        <p:nvSpPr>
-          <p:cNvPr id="10" name="Plus 9"/>
-          <p:cNvSpPr/>
-          <p:nvPr/>
-        </p:nvSpPr>
-        <p:spPr>
-          <a:xfrm>
-            <a:off x="1230260" y="1227346"/>
-            <a:ext cx="1010652" cy="1070810"/>
-          </a:xfrm>
-          <a:prstGeom prst="mathPlus">
-            <a:avLst/>
-          </a:prstGeom>
-        </p:spPr>
-        <p:style>
-          <a:lnRef idx="0">
-            <a:schemeClr val="dk1"/>
-          </a:lnRef>
-          <a:fillRef idx="3">
-            <a:schemeClr val="dk1"/>
-          </a:fillRef>
-          <a:effectRef idx="3">
-            <a:schemeClr val="dk1"/>
-          </a:effectRef>
-          <a:fontRef idx="minor">
-            <a:schemeClr val="lt1"/>
-          </a:fontRef>
-        </p:style>
-        <p:txBody>
-          <a:bodyPr rtlCol="0" anchor="ctr"/>
-          <a:lstStyle/>
-          <a:p>
-            <a:pPr algn="ctr"/>
-            <a:endParaRPr lang="en-US"/>
-          </a:p>
-        </p:txBody>
-      </p:sp>
-      <p:sp>
-        <p:nvSpPr>
-          <p:cNvPr id="15" name="Right Arrow 14"/>
-          <p:cNvSpPr/>
-          <p:nvPr/>
-        </p:nvSpPr>
-        <p:spPr>
-          <a:xfrm rot="5400000">
-            <a:off x="2026348" y="2858627"/>
-            <a:ext cx="1832810" cy="481264"/>
-          </a:xfrm>
-          <a:prstGeom prst="rightArrow">
-            <a:avLst/>
-          </a:prstGeom>
-        </p:spPr>
-        <p:style>
-          <a:lnRef idx="0">
-            <a:schemeClr val="accent5"/>
-          </a:lnRef>
-          <a:fillRef idx="3">
-            <a:schemeClr val="accent5"/>
-          </a:fillRef>
-          <a:effectRef idx="3">
-            <a:schemeClr val="accent5"/>
-          </a:effectRef>
-          <a:fontRef idx="minor">
-            <a:schemeClr val="lt1"/>
-          </a:fontRef>
-        </p:style>
-        <p:txBody>
-          <a:bodyPr rtlCol="0" anchor="ctr"/>
-          <a:lstStyle/>
-          <a:p>
-            <a:pPr algn="ctr"/>
-            <a:endParaRPr lang="en-US"/>
-          </a:p>
-        </p:txBody>
-      </p:sp>
-      <p:sp>
-        <p:nvSpPr>
-          <p:cNvPr id="16" name="Oval 15"/>
-          <p:cNvSpPr/>
-          <p:nvPr/>
-        </p:nvSpPr>
-        <p:spPr>
-          <a:xfrm>
-            <a:off x="2575363" y="4103264"/>
-            <a:ext cx="745958" cy="745958"/>
-          </a:xfrm>
-          <a:prstGeom prst="ellipse">
-            <a:avLst/>
-          </a:prstGeom>
-        </p:spPr>
-        <p:style>
-          <a:lnRef idx="0">
-            <a:schemeClr val="accent6"/>
-          </a:lnRef>
-          <a:fillRef idx="3">
-            <a:schemeClr val="accent6"/>
-          </a:fillRef>
-          <a:effectRef idx="3">
-            <a:schemeClr val="accent6"/>
-          </a:effectRef>
-          <a:fontRef idx="minor">
-            <a:schemeClr val="lt1"/>
-          </a:fontRef>
-        </p:style>
-        <p:txBody>
-          <a:bodyPr rtlCol="0" anchor="ctr"/>
-          <a:lstStyle/>
-          <a:p>
-            <a:pPr algn="ctr"/>
-            <a:r>
-              <a:rPr lang="en-US" dirty="0" smtClean="0"/>
-              <a:t>D</a:t>
-            </a:r>
-            <a:endParaRPr lang="en-US" dirty="0"/>
-          </a:p>
-        </p:txBody>
-      </p:sp>
-      <p:cxnSp>
-        <p:nvCxnSpPr>
-          <p:cNvPr id="21" name="Elbow Connector 20"/>
-          <p:cNvCxnSpPr>
-            <a:stCxn id="6" idx="0"/>
-            <a:endCxn id="4" idx="0"/>
-          </p:cNvCxnSpPr>
-          <p:nvPr/>
-        </p:nvCxnSpPr>
-        <p:spPr>
-          <a:xfrm rot="16200000" flipV="1">
-            <a:off x="3276629" y="-1454695"/>
-            <a:ext cx="84223" cy="5664868"/>
-          </a:xfrm>
-          <a:prstGeom prst="bentConnector3">
-            <a:avLst>
-              <a:gd name="adj1" fmla="val 1380345"/>
-            </a:avLst>
-          </a:prstGeom>
-          <a:ln w="101600">
-            <a:tailEnd type="triangle"/>
-          </a:ln>
-        </p:spPr>
-        <p:style>
-          <a:lnRef idx="3">
-            <a:schemeClr val="accent5"/>
-          </a:lnRef>
-          <a:fillRef idx="0">
-            <a:schemeClr val="accent5"/>
-          </a:fillRef>
-          <a:effectRef idx="2">
-            <a:schemeClr val="accent5"/>
-          </a:effectRef>
-          <a:fontRef idx="minor">
-            <a:schemeClr val="tx1"/>
-          </a:fontRef>
-        </p:style>
-      </p:cxnSp>
-      <p:cxnSp>
-        <p:nvCxnSpPr>
-          <p:cNvPr id="24" name="Elbow Connector 23"/>
-          <p:cNvCxnSpPr>
-            <a:stCxn id="16" idx="2"/>
-            <a:endCxn id="4" idx="4"/>
-          </p:cNvCxnSpPr>
-          <p:nvPr/>
-        </p:nvCxnSpPr>
-        <p:spPr>
-          <a:xfrm rot="10800000">
-            <a:off x="486307" y="2081585"/>
-            <a:ext cx="2089057" cy="2394658"/>
-          </a:xfrm>
-          <a:prstGeom prst="bentConnector2">
-            <a:avLst/>
-          </a:prstGeom>
-          <a:ln w="101600">
-            <a:tailEnd type="triangle"/>
-          </a:ln>
-        </p:spPr>
-        <p:style>
-          <a:lnRef idx="3">
-            <a:schemeClr val="accent5"/>
-          </a:lnRef>
-          <a:fillRef idx="0">
-            <a:schemeClr val="accent5"/>
-          </a:fillRef>
-          <a:effectRef idx="2">
-            <a:schemeClr val="accent5"/>
-          </a:effectRef>
-          <a:fontRef idx="minor">
-            <a:schemeClr val="tx1"/>
-          </a:fontRef>
-        </p:style>
-      </p:cxnSp>
-      <mc:AlternateContent xmlns:mc="http://schemas.openxmlformats.org/markup-compatibility/2006">
-        <mc:Choice xmlns:a14="http://schemas.microsoft.com/office/drawing/2010/main" Requires="a14">
-          <p:sp>
-            <p:nvSpPr>
-              <p:cNvPr id="27" name="TextBox 26"/>
-              <p:cNvSpPr txBox="1"/>
-              <p:nvPr/>
-            </p:nvSpPr>
-            <p:spPr>
-              <a:xfrm>
-                <a:off x="4278052" y="2890986"/>
-                <a:ext cx="2826223" cy="276999"/>
-              </a:xfrm>
-              <a:prstGeom prst="rect">
-                <a:avLst/>
-              </a:prstGeom>
-              <a:noFill/>
-            </p:spPr>
-            <p:txBody>
-              <a:bodyPr wrap="none" lIns="0" tIns="0" rIns="0" bIns="0" rtlCol="0">
-                <a:spAutoFit/>
-              </a:bodyPr>
-              <a:lstStyle/>
-              <a:p>
-                <a14:m>
-                  <m:oMathPara xmlns:m="http://schemas.openxmlformats.org/officeDocument/2006/math">
-                    <m:oMathParaPr>
-                      <m:jc m:val="centerGroup"/>
-                    </m:oMathParaPr>
-                    <m:oMath xmlns:m="http://schemas.openxmlformats.org/officeDocument/2006/math">
-                      <m:sSup>
-                        <m:sSupPr>
-                          <m:ctrlPr>
-                            <a:rPr lang="en-US" b="0" i="1" smtClean="0">
-                              <a:latin typeface="Cambria Math" panose="02040503050406030204" pitchFamily="18" charset="0"/>
-                            </a:rPr>
-                          </m:ctrlPr>
-                        </m:sSupPr>
-                        <m:e>
-                          <m:r>
-                            <a:rPr lang="en-US" i="1" smtClean="0">
-                              <a:latin typeface="Cambria Math" panose="02040503050406030204" pitchFamily="18" charset="0"/>
-                            </a:rPr>
-                            <m:t>𝐴</m:t>
-                          </m:r>
-                        </m:e>
-                        <m:sup>
-                          <m:r>
-                            <a:rPr lang="en-US" b="0" i="1" smtClean="0">
-                              <a:latin typeface="Cambria Math" panose="02040503050406030204" pitchFamily="18" charset="0"/>
-                            </a:rPr>
-                            <m:t>′</m:t>
-                          </m:r>
-                        </m:sup>
-                      </m:sSup>
-                      <m:r>
-                        <a:rPr lang="en-US" i="1" smtClean="0">
-                          <a:latin typeface="Cambria Math" panose="02040503050406030204" pitchFamily="18" charset="0"/>
-                        </a:rPr>
-                        <m:t>=</m:t>
-                      </m:r>
-                      <m:r>
-                        <a:rPr lang="en-US" i="1" smtClean="0">
-                          <a:latin typeface="Cambria Math" panose="02040503050406030204" pitchFamily="18" charset="0"/>
-                          <a:ea typeface="Cambria Math" panose="02040503050406030204" pitchFamily="18" charset="0"/>
-                        </a:rPr>
-                        <m:t>𝛼</m:t>
-                      </m:r>
-                      <m:r>
-                        <a:rPr lang="en-US" i="1" smtClean="0">
-                          <a:latin typeface="Cambria Math" panose="02040503050406030204" pitchFamily="18" charset="0"/>
-                          <a:ea typeface="Cambria Math" panose="02040503050406030204" pitchFamily="18" charset="0"/>
-                        </a:rPr>
-                        <m:t>×</m:t>
-                      </m:r>
-                      <m:r>
-                        <a:rPr lang="en-US" b="0" i="1" smtClean="0">
-                          <a:latin typeface="Cambria Math" panose="02040503050406030204" pitchFamily="18" charset="0"/>
-                          <a:ea typeface="Cambria Math" panose="02040503050406030204" pitchFamily="18" charset="0"/>
-                        </a:rPr>
-                        <m:t>𝐷</m:t>
-                      </m:r>
-                      <m:r>
-                        <a:rPr lang="en-US" b="0" i="1" smtClean="0">
-                          <a:latin typeface="Cambria Math" panose="02040503050406030204" pitchFamily="18" charset="0"/>
-                          <a:ea typeface="Cambria Math" panose="02040503050406030204" pitchFamily="18" charset="0"/>
-                        </a:rPr>
-                        <m:t>×</m:t>
-                      </m:r>
-                      <m:r>
-                        <a:rPr lang="en-US" b="0" i="1" smtClean="0">
-                          <a:latin typeface="Cambria Math" panose="02040503050406030204" pitchFamily="18" charset="0"/>
-                          <a:ea typeface="Cambria Math" panose="02040503050406030204" pitchFamily="18" charset="0"/>
-                        </a:rPr>
-                        <m:t>𝐶</m:t>
-                      </m:r>
-                      <m:r>
-                        <a:rPr lang="en-US" b="0" i="1" smtClean="0">
-                          <a:latin typeface="Cambria Math" panose="02040503050406030204" pitchFamily="18" charset="0"/>
-                          <a:ea typeface="Cambria Math" panose="02040503050406030204" pitchFamily="18" charset="0"/>
-                        </a:rPr>
-                        <m:t>−</m:t>
-                      </m:r>
-                      <m:r>
-                        <a:rPr lang="en-US" b="0" i="1" smtClean="0">
-                          <a:latin typeface="Cambria Math" panose="02040503050406030204" pitchFamily="18" charset="0"/>
-                          <a:ea typeface="Cambria Math" panose="02040503050406030204" pitchFamily="18" charset="0"/>
-                        </a:rPr>
-                        <m:t>𝛽</m:t>
-                      </m:r>
-                      <m:r>
-                        <a:rPr lang="en-US" b="0" i="1" smtClean="0">
-                          <a:latin typeface="Cambria Math" panose="02040503050406030204" pitchFamily="18" charset="0"/>
-                          <a:ea typeface="Cambria Math" panose="02040503050406030204" pitchFamily="18" charset="0"/>
-                        </a:rPr>
-                        <m:t>×</m:t>
-                      </m:r>
-                      <m:r>
-                        <a:rPr lang="en-US" b="0" i="1" smtClean="0">
-                          <a:latin typeface="Cambria Math" panose="02040503050406030204" pitchFamily="18" charset="0"/>
-                          <a:ea typeface="Cambria Math" panose="02040503050406030204" pitchFamily="18" charset="0"/>
-                        </a:rPr>
-                        <m:t>𝐴</m:t>
-                      </m:r>
-                      <m:r>
-                        <a:rPr lang="en-US" b="0" i="1" smtClean="0">
-                          <a:latin typeface="Cambria Math" panose="02040503050406030204" pitchFamily="18" charset="0"/>
-                          <a:ea typeface="Cambria Math" panose="02040503050406030204" pitchFamily="18" charset="0"/>
-                        </a:rPr>
-                        <m:t>×</m:t>
-                      </m:r>
-                      <m:r>
-                        <a:rPr lang="en-US" b="0" i="1" smtClean="0">
-                          <a:latin typeface="Cambria Math" panose="02040503050406030204" pitchFamily="18" charset="0"/>
-                          <a:ea typeface="Cambria Math" panose="02040503050406030204" pitchFamily="18" charset="0"/>
-                        </a:rPr>
-                        <m:t>𝐵</m:t>
-                      </m:r>
-                    </m:oMath>
-                  </m:oMathPara>
-                </a14:m>
-                <a:endParaRPr lang="en-US" dirty="0"/>
-              </a:p>
-            </p:txBody>
-          </p:sp>
-        </mc:Choice>
-        <mc:Fallback>
-          <p:sp>
-            <p:nvSpPr>
-              <p:cNvPr id="27" name="TextBox 26"/>
-              <p:cNvSpPr txBox="1">
-                <a:spLocks noRot="1" noChangeAspect="1" noMove="1" noResize="1" noEditPoints="1" noAdjustHandles="1" noChangeArrowheads="1" noChangeShapeType="1" noTextEdit="1"/>
-              </p:cNvSpPr>
-              <p:nvPr/>
-            </p:nvSpPr>
-            <p:spPr>
-              <a:xfrm>
-                <a:off x="4278052" y="2890986"/>
-                <a:ext cx="2826223" cy="276999"/>
-              </a:xfrm>
-              <a:prstGeom prst="rect">
-                <a:avLst/>
-              </a:prstGeom>
-              <a:blipFill>
-                <a:blip r:embed="rId2"/>
-                <a:stretch>
-                  <a:fillRect l="-1512" t="-2174" r="-1296" b="-32609"/>
-                </a:stretch>
-              </a:blipFill>
-            </p:spPr>
-            <p:txBody>
-              <a:bodyPr/>
-              <a:lstStyle/>
-              <a:p>
-                <a:r>
-                  <a:rPr lang="en-US">
-                    <a:noFill/>
-                  </a:rPr>
-                  <a:t> </a:t>
-                </a:r>
-              </a:p>
-            </p:txBody>
-          </p:sp>
-        </mc:Fallback>
-      </mc:AlternateContent>
-      <mc:AlternateContent xmlns:mc="http://schemas.openxmlformats.org/markup-compatibility/2006">
-        <mc:Choice xmlns:a14="http://schemas.microsoft.com/office/drawing/2010/main" Requires="a14">
-          <p:sp>
-            <p:nvSpPr>
-              <p:cNvPr id="28" name="TextBox 27"/>
-              <p:cNvSpPr txBox="1"/>
-              <p:nvPr/>
-            </p:nvSpPr>
-            <p:spPr>
-              <a:xfrm>
-                <a:off x="4278051" y="3504596"/>
-                <a:ext cx="1743233" cy="276999"/>
-              </a:xfrm>
-              <a:prstGeom prst="rect">
-                <a:avLst/>
-              </a:prstGeom>
-              <a:noFill/>
-            </p:spPr>
-            <p:txBody>
-              <a:bodyPr wrap="none" lIns="0" tIns="0" rIns="0" bIns="0" rtlCol="0">
-                <a:spAutoFit/>
-              </a:bodyPr>
-              <a:lstStyle/>
-              <a:p>
-                <a14:m>
-                  <m:oMathPara xmlns:m="http://schemas.openxmlformats.org/officeDocument/2006/math">
-                    <m:oMathParaPr>
-                      <m:jc m:val="centerGroup"/>
-                    </m:oMathParaPr>
+        </p:grpSpPr>
+        <p:sp>
+          <p:nvSpPr>
+            <p:cNvPr id="4" name="Oval 3"/>
+            <p:cNvSpPr/>
+            <p:nvPr/>
+          </p:nvSpPr>
+          <p:spPr>
+            <a:xfrm>
+              <a:off x="1326665" y="2425873"/>
+              <a:ext cx="745958" cy="745958"/>
+            </a:xfrm>
+            <a:prstGeom prst="ellipse">
+              <a:avLst/>
+            </a:prstGeom>
+          </p:spPr>
+          <p:style>
+            <a:lnRef idx="0">
+              <a:schemeClr val="accent6"/>
+            </a:lnRef>
+            <a:fillRef idx="3">
+              <a:schemeClr val="accent6"/>
+            </a:fillRef>
+            <a:effectRef idx="3">
+              <a:schemeClr val="accent6"/>
+            </a:effectRef>
+            <a:fontRef idx="minor">
+              <a:schemeClr val="lt1"/>
+            </a:fontRef>
+          </p:style>
+          <p:txBody>
+            <a:bodyPr rtlCol="0" anchor="ctr"/>
+            <a:lstStyle/>
+            <a:p>
+              <a:pPr algn="ctr"/>
+              <a:r>
+                <a:rPr lang="en-US" dirty="0" smtClean="0"/>
+                <a:t>A</a:t>
+              </a:r>
+              <a:endParaRPr lang="en-US" dirty="0"/>
+            </a:p>
+          </p:txBody>
+        </p:sp>
+        <p:sp>
+          <p:nvSpPr>
+            <p:cNvPr id="5" name="Oval 4"/>
+            <p:cNvSpPr/>
+            <p:nvPr/>
+          </p:nvSpPr>
+          <p:spPr>
+            <a:xfrm>
+              <a:off x="3783112" y="2467988"/>
+              <a:ext cx="745958" cy="745958"/>
+            </a:xfrm>
+            <a:prstGeom prst="ellipse">
+              <a:avLst/>
+            </a:prstGeom>
+          </p:spPr>
+          <p:style>
+            <a:lnRef idx="0">
+              <a:schemeClr val="accent6"/>
+            </a:lnRef>
+            <a:fillRef idx="3">
+              <a:schemeClr val="accent6"/>
+            </a:fillRef>
+            <a:effectRef idx="3">
+              <a:schemeClr val="accent6"/>
+            </a:effectRef>
+            <a:fontRef idx="minor">
+              <a:schemeClr val="lt1"/>
+            </a:fontRef>
+          </p:style>
+          <p:txBody>
+            <a:bodyPr rtlCol="0" anchor="ctr"/>
+            <a:lstStyle/>
+            <a:p>
+              <a:pPr algn="ctr"/>
+              <a:r>
+                <a:rPr lang="en-US" dirty="0" smtClean="0"/>
+                <a:t>B</a:t>
+              </a:r>
+              <a:endParaRPr lang="en-US" dirty="0"/>
+            </a:p>
+          </p:txBody>
+        </p:sp>
+        <p:sp>
+          <p:nvSpPr>
+            <p:cNvPr id="6" name="Oval 5"/>
+            <p:cNvSpPr/>
+            <p:nvPr/>
+          </p:nvSpPr>
+          <p:spPr>
+            <a:xfrm>
+              <a:off x="6407591" y="1180409"/>
+              <a:ext cx="745958" cy="745958"/>
+            </a:xfrm>
+            <a:prstGeom prst="ellipse">
+              <a:avLst/>
+            </a:prstGeom>
+          </p:spPr>
+          <p:style>
+            <a:lnRef idx="0">
+              <a:schemeClr val="accent6"/>
+            </a:lnRef>
+            <a:fillRef idx="3">
+              <a:schemeClr val="accent6"/>
+            </a:fillRef>
+            <a:effectRef idx="3">
+              <a:schemeClr val="accent6"/>
+            </a:effectRef>
+            <a:fontRef idx="minor">
+              <a:schemeClr val="lt1"/>
+            </a:fontRef>
+          </p:style>
+          <p:txBody>
+            <a:bodyPr rtlCol="0" anchor="ctr"/>
+            <a:lstStyle/>
+            <a:p>
+              <a:pPr algn="ctr"/>
+              <a:r>
+                <a:rPr lang="en-US" dirty="0" smtClean="0"/>
+                <a:t>C</a:t>
+              </a:r>
+              <a:endParaRPr lang="en-US" dirty="0"/>
+            </a:p>
+          </p:txBody>
+        </p:sp>
+        <p:sp>
+          <p:nvSpPr>
+            <p:cNvPr id="9" name="Right Arrow 8"/>
+            <p:cNvSpPr/>
+            <p:nvPr/>
+          </p:nvSpPr>
+          <p:spPr>
+            <a:xfrm rot="20028090">
+              <a:off x="4566640" y="1979845"/>
+              <a:ext cx="1832810" cy="481264"/>
+            </a:xfrm>
+            <a:prstGeom prst="rightArrow">
+              <a:avLst/>
+            </a:prstGeom>
+          </p:spPr>
+          <p:style>
+            <a:lnRef idx="0">
+              <a:schemeClr val="accent5"/>
+            </a:lnRef>
+            <a:fillRef idx="3">
+              <a:schemeClr val="accent5"/>
+            </a:fillRef>
+            <a:effectRef idx="3">
+              <a:schemeClr val="accent5"/>
+            </a:effectRef>
+            <a:fontRef idx="minor">
+              <a:schemeClr val="lt1"/>
+            </a:fontRef>
+          </p:style>
+          <p:txBody>
+            <a:bodyPr rtlCol="0" anchor="ctr"/>
+            <a:lstStyle/>
+            <a:p>
+              <a:pPr algn="ctr"/>
+              <a:endParaRPr lang="en-US"/>
+            </a:p>
+          </p:txBody>
+        </p:sp>
+        <p:sp>
+          <p:nvSpPr>
+            <p:cNvPr id="10" name="Plus 9"/>
+            <p:cNvSpPr/>
+            <p:nvPr/>
+          </p:nvSpPr>
+          <p:spPr>
+            <a:xfrm>
+              <a:off x="2499338" y="2467988"/>
+              <a:ext cx="813407" cy="791604"/>
+            </a:xfrm>
+            <a:prstGeom prst="mathPlus">
+              <a:avLst/>
+            </a:prstGeom>
+          </p:spPr>
+          <p:style>
+            <a:lnRef idx="0">
+              <a:schemeClr val="dk1"/>
+            </a:lnRef>
+            <a:fillRef idx="3">
+              <a:schemeClr val="dk1"/>
+            </a:fillRef>
+            <a:effectRef idx="3">
+              <a:schemeClr val="dk1"/>
+            </a:effectRef>
+            <a:fontRef idx="minor">
+              <a:schemeClr val="lt1"/>
+            </a:fontRef>
+          </p:style>
+          <p:txBody>
+            <a:bodyPr rtlCol="0" anchor="ctr"/>
+            <a:lstStyle/>
+            <a:p>
+              <a:pPr algn="ctr"/>
+              <a:endParaRPr lang="en-US"/>
+            </a:p>
+          </p:txBody>
+        </p:sp>
+        <p:sp>
+          <p:nvSpPr>
+            <p:cNvPr id="16" name="Oval 15"/>
+            <p:cNvSpPr/>
+            <p:nvPr/>
+          </p:nvSpPr>
+          <p:spPr>
+            <a:xfrm>
+              <a:off x="3788701" y="5193510"/>
+              <a:ext cx="745958" cy="745958"/>
+            </a:xfrm>
+            <a:prstGeom prst="ellipse">
+              <a:avLst/>
+            </a:prstGeom>
+          </p:spPr>
+          <p:style>
+            <a:lnRef idx="0">
+              <a:schemeClr val="accent6"/>
+            </a:lnRef>
+            <a:fillRef idx="3">
+              <a:schemeClr val="accent6"/>
+            </a:fillRef>
+            <a:effectRef idx="3">
+              <a:schemeClr val="accent6"/>
+            </a:effectRef>
+            <a:fontRef idx="minor">
+              <a:schemeClr val="lt1"/>
+            </a:fontRef>
+          </p:style>
+          <p:txBody>
+            <a:bodyPr rtlCol="0" anchor="ctr"/>
+            <a:lstStyle/>
+            <a:p>
+              <a:pPr algn="ctr"/>
+              <a:r>
+                <a:rPr lang="en-US" dirty="0" smtClean="0"/>
+                <a:t>D</a:t>
+              </a:r>
+              <a:endParaRPr lang="en-US" dirty="0"/>
+            </a:p>
+          </p:txBody>
+        </p:sp>
+        <p:cxnSp>
+          <p:nvCxnSpPr>
+            <p:cNvPr id="21" name="Elbow Connector 20"/>
+            <p:cNvCxnSpPr>
+              <a:stCxn id="6" idx="0"/>
+              <a:endCxn id="4" idx="0"/>
+            </p:cNvCxnSpPr>
+            <p:nvPr/>
+          </p:nvCxnSpPr>
+          <p:spPr>
+            <a:xfrm rot="16200000" flipH="1" flipV="1">
+              <a:off x="3617375" y="-737322"/>
+              <a:ext cx="1245464" cy="5080926"/>
+            </a:xfrm>
+            <a:prstGeom prst="bentConnector3">
+              <a:avLst>
+                <a:gd name="adj1" fmla="val -18355"/>
+              </a:avLst>
+            </a:prstGeom>
+            <a:ln w="101600">
+              <a:tailEnd type="triangle"/>
+            </a:ln>
+          </p:spPr>
+          <p:style>
+            <a:lnRef idx="3">
+              <a:schemeClr val="accent5"/>
+            </a:lnRef>
+            <a:fillRef idx="0">
+              <a:schemeClr val="accent5"/>
+            </a:fillRef>
+            <a:effectRef idx="2">
+              <a:schemeClr val="accent5"/>
+            </a:effectRef>
+            <a:fontRef idx="minor">
+              <a:schemeClr val="tx1"/>
+            </a:fontRef>
+          </p:style>
+        </p:cxnSp>
+        <p:cxnSp>
+          <p:nvCxnSpPr>
+            <p:cNvPr id="24" name="Elbow Connector 23"/>
+            <p:cNvCxnSpPr>
+              <a:stCxn id="16" idx="2"/>
+              <a:endCxn id="4" idx="4"/>
+            </p:cNvCxnSpPr>
+            <p:nvPr/>
+          </p:nvCxnSpPr>
+          <p:spPr>
+            <a:xfrm rot="10800000">
+              <a:off x="1699645" y="3171831"/>
+              <a:ext cx="2089057" cy="2394658"/>
+            </a:xfrm>
+            <a:prstGeom prst="bentConnector2">
+              <a:avLst/>
+            </a:prstGeom>
+            <a:ln w="101600">
+              <a:tailEnd type="triangle"/>
+            </a:ln>
+          </p:spPr>
+          <p:style>
+            <a:lnRef idx="3">
+              <a:schemeClr val="accent5"/>
+            </a:lnRef>
+            <a:fillRef idx="0">
+              <a:schemeClr val="accent5"/>
+            </a:fillRef>
+            <a:effectRef idx="2">
+              <a:schemeClr val="accent5"/>
+            </a:effectRef>
+            <a:fontRef idx="minor">
+              <a:schemeClr val="tx1"/>
+            </a:fontRef>
+          </p:style>
+        </p:cxnSp>
+        <mc:AlternateContent xmlns:mc="http://schemas.openxmlformats.org/markup-compatibility/2006">
+          <mc:Choice xmlns:a14="http://schemas.microsoft.com/office/drawing/2010/main" Requires="a14">
+            <p:sp>
+              <p:nvSpPr>
+                <p:cNvPr id="27" name="TextBox 26"/>
+                <p:cNvSpPr txBox="1"/>
+                <p:nvPr/>
+              </p:nvSpPr>
+              <p:spPr>
+                <a:xfrm>
+                  <a:off x="5118777" y="3318556"/>
+                  <a:ext cx="2826223" cy="276999"/>
+                </a:xfrm>
+                <a:prstGeom prst="rect">
+                  <a:avLst/>
+                </a:prstGeom>
+                <a:noFill/>
+              </p:spPr>
+              <p:txBody>
+                <a:bodyPr wrap="none" lIns="0" tIns="0" rIns="0" bIns="0" rtlCol="0">
+                  <a:spAutoFit/>
+                </a:bodyPr>
+                <a:lstStyle/>
+                <a:p>
+                  <a:pPr/>
+                  <a14:m>
+                    <m:oMathPara xmlns:m="http://schemas.openxmlformats.org/officeDocument/2006/math">
+                      <m:oMathParaPr>
+                        <m:jc m:val="centerGroup"/>
+                      </m:oMathParaPr>
+                      <m:oMath xmlns:m="http://schemas.openxmlformats.org/officeDocument/2006/math">
+                        <m:sSup>
+                          <m:sSupPr>
+                            <m:ctrlPr>
+                              <a:rPr lang="en-US" b="0" i="1" smtClean="0">
+                                <a:latin typeface="Cambria Math" panose="02040503050406030204" pitchFamily="18" charset="0"/>
+                              </a:rPr>
+                            </m:ctrlPr>
+                          </m:sSupPr>
+                          <m:e>
+                            <m:r>
+                              <a:rPr lang="en-US" i="1" smtClean="0">
+                                <a:latin typeface="Cambria Math" panose="02040503050406030204" pitchFamily="18" charset="0"/>
+                              </a:rPr>
+                              <m:t>𝐴</m:t>
+                            </m:r>
+                          </m:e>
+                          <m:sup>
+                            <m:r>
+                              <a:rPr lang="en-US" b="0" i="1" smtClean="0">
+                                <a:latin typeface="Cambria Math" panose="02040503050406030204" pitchFamily="18" charset="0"/>
+                              </a:rPr>
+                              <m:t>′</m:t>
+                            </m:r>
+                          </m:sup>
+                        </m:sSup>
+                        <m:r>
+                          <a:rPr lang="en-US" i="1" smtClean="0">
+                            <a:latin typeface="Cambria Math" panose="02040503050406030204" pitchFamily="18" charset="0"/>
+                          </a:rPr>
+                          <m:t>=</m:t>
+                        </m:r>
+                        <m:r>
+                          <a:rPr lang="en-US" i="1" smtClean="0">
+                            <a:latin typeface="Cambria Math" panose="02040503050406030204" pitchFamily="18" charset="0"/>
+                            <a:ea typeface="Cambria Math" panose="02040503050406030204" pitchFamily="18" charset="0"/>
+                          </a:rPr>
+                          <m:t>𝛼</m:t>
+                        </m:r>
+                        <m:r>
+                          <a:rPr lang="en-US" i="1" smtClean="0">
+                            <a:latin typeface="Cambria Math" panose="02040503050406030204" pitchFamily="18" charset="0"/>
+                            <a:ea typeface="Cambria Math" panose="02040503050406030204" pitchFamily="18" charset="0"/>
+                          </a:rPr>
+                          <m:t>×</m:t>
+                        </m:r>
+                        <m:r>
+                          <a:rPr lang="en-US" b="0" i="1" smtClean="0">
+                            <a:latin typeface="Cambria Math" panose="02040503050406030204" pitchFamily="18" charset="0"/>
+                            <a:ea typeface="Cambria Math" panose="02040503050406030204" pitchFamily="18" charset="0"/>
+                          </a:rPr>
+                          <m:t>𝐷</m:t>
+                        </m:r>
+                        <m:r>
+                          <a:rPr lang="en-US" b="0" i="1" smtClean="0">
+                            <a:latin typeface="Cambria Math" panose="02040503050406030204" pitchFamily="18" charset="0"/>
+                            <a:ea typeface="Cambria Math" panose="02040503050406030204" pitchFamily="18" charset="0"/>
+                          </a:rPr>
+                          <m:t>×</m:t>
+                        </m:r>
+                        <m:r>
+                          <a:rPr lang="en-US" b="0" i="1" smtClean="0">
+                            <a:latin typeface="Cambria Math" panose="02040503050406030204" pitchFamily="18" charset="0"/>
+                            <a:ea typeface="Cambria Math" panose="02040503050406030204" pitchFamily="18" charset="0"/>
+                          </a:rPr>
+                          <m:t>𝐶</m:t>
+                        </m:r>
+                        <m:r>
+                          <a:rPr lang="en-US" b="0" i="1" smtClean="0">
+                            <a:latin typeface="Cambria Math" panose="02040503050406030204" pitchFamily="18" charset="0"/>
+                            <a:ea typeface="Cambria Math" panose="02040503050406030204" pitchFamily="18" charset="0"/>
+                          </a:rPr>
+                          <m:t>−</m:t>
+                        </m:r>
+                        <m:r>
+                          <a:rPr lang="en-US" b="0" i="1" smtClean="0">
+                            <a:latin typeface="Cambria Math" panose="02040503050406030204" pitchFamily="18" charset="0"/>
+                            <a:ea typeface="Cambria Math" panose="02040503050406030204" pitchFamily="18" charset="0"/>
+                          </a:rPr>
+                          <m:t>𝛽</m:t>
+                        </m:r>
+                        <m:r>
+                          <a:rPr lang="en-US" b="0" i="1" smtClean="0">
+                            <a:latin typeface="Cambria Math" panose="02040503050406030204" pitchFamily="18" charset="0"/>
+                            <a:ea typeface="Cambria Math" panose="02040503050406030204" pitchFamily="18" charset="0"/>
+                          </a:rPr>
+                          <m:t>×</m:t>
+                        </m:r>
+                        <m:r>
+                          <a:rPr lang="en-US" b="0" i="1" smtClean="0">
+                            <a:latin typeface="Cambria Math" panose="02040503050406030204" pitchFamily="18" charset="0"/>
+                            <a:ea typeface="Cambria Math" panose="02040503050406030204" pitchFamily="18" charset="0"/>
+                          </a:rPr>
+                          <m:t>𝐴</m:t>
+                        </m:r>
+                        <m:r>
+                          <a:rPr lang="en-US" b="0" i="1" smtClean="0">
+                            <a:latin typeface="Cambria Math" panose="02040503050406030204" pitchFamily="18" charset="0"/>
+                            <a:ea typeface="Cambria Math" panose="02040503050406030204" pitchFamily="18" charset="0"/>
+                          </a:rPr>
+                          <m:t>×</m:t>
+                        </m:r>
+                        <m:r>
+                          <a:rPr lang="en-US" b="0" i="1" smtClean="0">
+                            <a:latin typeface="Cambria Math" panose="02040503050406030204" pitchFamily="18" charset="0"/>
+                            <a:ea typeface="Cambria Math" panose="02040503050406030204" pitchFamily="18" charset="0"/>
+                          </a:rPr>
+                          <m:t>𝐵</m:t>
+                        </m:r>
+                      </m:oMath>
+                    </m:oMathPara>
+                  </a14:m>
+                  <a:endParaRPr lang="en-US" dirty="0"/>
+                </a:p>
+              </p:txBody>
+            </p:sp>
+          </mc:Choice>
+          <mc:Fallback>
+            <p:sp>
+              <p:nvSpPr>
+                <p:cNvPr id="27" name="TextBox 26"/>
+                <p:cNvSpPr txBox="1">
+                  <a:spLocks noRot="1" noChangeAspect="1" noMove="1" noResize="1" noEditPoints="1" noAdjustHandles="1" noChangeArrowheads="1" noChangeShapeType="1" noTextEdit="1"/>
+                </p:cNvSpPr>
+                <p:nvPr/>
+              </p:nvSpPr>
+              <p:spPr>
+                <a:xfrm>
+                  <a:off x="5118777" y="3318556"/>
+                  <a:ext cx="2826223" cy="276999"/>
+                </a:xfrm>
+                <a:prstGeom prst="rect">
+                  <a:avLst/>
+                </a:prstGeom>
+                <a:blipFill>
+                  <a:blip r:embed="rId2"/>
+                  <a:stretch>
+                    <a:fillRect l="-1512" t="-2174" r="-1296" b="-32609"/>
+                  </a:stretch>
+                </a:blipFill>
+              </p:spPr>
+              <p:txBody>
+                <a:bodyPr/>
+                <a:lstStyle/>
+                <a:p>
+                  <a:r>
+                    <a:rPr lang="en-US">
+                      <a:noFill/>
+                    </a:rPr>
+                    <a:t> </a:t>
+                  </a:r>
+                </a:p>
+              </p:txBody>
+            </p:sp>
+          </mc:Fallback>
+        </mc:AlternateContent>
+        <mc:AlternateContent xmlns:mc="http://schemas.openxmlformats.org/markup-compatibility/2006">
+          <mc:Choice xmlns:a14="http://schemas.microsoft.com/office/drawing/2010/main" Requires="a14">
+            <p:sp>
+              <p:nvSpPr>
+                <p:cNvPr id="28" name="TextBox 27"/>
+                <p:cNvSpPr txBox="1"/>
+                <p:nvPr/>
+              </p:nvSpPr>
+              <p:spPr>
+                <a:xfrm>
+                  <a:off x="5118776" y="3932166"/>
+                  <a:ext cx="2577629" cy="276999"/>
+                </a:xfrm>
+                <a:prstGeom prst="rect">
+                  <a:avLst/>
+                </a:prstGeom>
+                <a:noFill/>
+              </p:spPr>
+              <p:txBody>
+                <a:bodyPr wrap="none" lIns="0" tIns="0" rIns="0" bIns="0" rtlCol="0">
+                  <a:spAutoFit/>
+                </a:bodyPr>
+                <a:lstStyle/>
+                <a:p>
+                  <a:pPr/>
+                  <a14:m>
+                    <m:oMathPara xmlns:m="http://schemas.openxmlformats.org/officeDocument/2006/math">
+                      <m:oMathParaPr>
+                        <m:jc m:val="centerGroup"/>
+                      </m:oMathParaPr>
+                      <m:oMath xmlns:m="http://schemas.openxmlformats.org/officeDocument/2006/math">
+                        <m:sSup>
+                          <m:sSupPr>
+                            <m:ctrlPr>
+                              <a:rPr lang="en-US" b="0" i="1" smtClean="0">
+                                <a:latin typeface="Cambria Math" panose="02040503050406030204" pitchFamily="18" charset="0"/>
+                              </a:rPr>
+                            </m:ctrlPr>
+                          </m:sSupPr>
+                          <m:e>
+                            <m:r>
+                              <a:rPr lang="en-US" b="0" i="1" smtClean="0">
+                                <a:latin typeface="Cambria Math" panose="02040503050406030204" pitchFamily="18" charset="0"/>
+                              </a:rPr>
+                              <m:t>𝐵</m:t>
+                            </m:r>
+                          </m:e>
+                          <m:sup>
+                            <m:r>
+                              <a:rPr lang="en-US" b="0" i="1" smtClean="0">
+                                <a:latin typeface="Cambria Math" panose="02040503050406030204" pitchFamily="18" charset="0"/>
+                              </a:rPr>
+                              <m:t>′</m:t>
+                            </m:r>
+                          </m:sup>
+                        </m:sSup>
+                        <m:r>
+                          <a:rPr lang="en-US" i="1" smtClean="0">
+                            <a:latin typeface="Cambria Math" panose="02040503050406030204" pitchFamily="18" charset="0"/>
+                          </a:rPr>
+                          <m:t>=</m:t>
+                        </m:r>
+                        <m:r>
+                          <a:rPr lang="en-US" b="0" i="1" smtClean="0">
+                            <a:latin typeface="Cambria Math" panose="02040503050406030204" pitchFamily="18" charset="0"/>
+                            <a:ea typeface="Cambria Math" panose="02040503050406030204" pitchFamily="18" charset="0"/>
+                          </a:rPr>
+                          <m:t>−</m:t>
+                        </m:r>
+                        <m:r>
+                          <a:rPr lang="en-US" b="0" i="1" smtClean="0">
+                            <a:latin typeface="Cambria Math" panose="02040503050406030204" pitchFamily="18" charset="0"/>
+                            <a:ea typeface="Cambria Math" panose="02040503050406030204" pitchFamily="18" charset="0"/>
+                          </a:rPr>
+                          <m:t>𝛽</m:t>
+                        </m:r>
+                        <m:r>
+                          <a:rPr lang="en-US" b="0" i="1" smtClean="0">
+                            <a:latin typeface="Cambria Math" panose="02040503050406030204" pitchFamily="18" charset="0"/>
+                            <a:ea typeface="Cambria Math" panose="02040503050406030204" pitchFamily="18" charset="0"/>
+                          </a:rPr>
+                          <m:t>×</m:t>
+                        </m:r>
+                        <m:r>
+                          <a:rPr lang="en-US" b="0" i="1" smtClean="0">
+                            <a:latin typeface="Cambria Math" panose="02040503050406030204" pitchFamily="18" charset="0"/>
+                            <a:ea typeface="Cambria Math" panose="02040503050406030204" pitchFamily="18" charset="0"/>
+                          </a:rPr>
+                          <m:t>𝐴</m:t>
+                        </m:r>
+                        <m:r>
+                          <a:rPr lang="en-US" b="0" i="1" smtClean="0">
+                            <a:latin typeface="Cambria Math" panose="02040503050406030204" pitchFamily="18" charset="0"/>
+                            <a:ea typeface="Cambria Math" panose="02040503050406030204" pitchFamily="18" charset="0"/>
+                          </a:rPr>
+                          <m:t>×</m:t>
+                        </m:r>
+                        <m:r>
+                          <a:rPr lang="en-US" b="0" i="1" smtClean="0">
+                            <a:latin typeface="Cambria Math" panose="02040503050406030204" pitchFamily="18" charset="0"/>
+                            <a:ea typeface="Cambria Math" panose="02040503050406030204" pitchFamily="18" charset="0"/>
+                          </a:rPr>
+                          <m:t>𝐵</m:t>
+                        </m:r>
+                        <m:r>
+                          <a:rPr lang="en-US" b="0" i="1" smtClean="0">
+                            <a:latin typeface="Cambria Math" panose="02040503050406030204" pitchFamily="18" charset="0"/>
+                            <a:ea typeface="Cambria Math" panose="02040503050406030204" pitchFamily="18" charset="0"/>
+                          </a:rPr>
+                          <m:t>−</m:t>
+                        </m:r>
+                        <m:r>
+                          <a:rPr lang="en-US" b="0" i="1" smtClean="0">
+                            <a:latin typeface="Cambria Math" panose="02040503050406030204" pitchFamily="18" charset="0"/>
+                            <a:ea typeface="Cambria Math" panose="02040503050406030204" pitchFamily="18" charset="0"/>
+                          </a:rPr>
+                          <m:t>𝛿</m:t>
+                        </m:r>
+                        <m:r>
+                          <a:rPr lang="en-US" b="0" i="1" smtClean="0">
+                            <a:latin typeface="Cambria Math" panose="02040503050406030204" pitchFamily="18" charset="0"/>
+                            <a:ea typeface="Cambria Math" panose="02040503050406030204" pitchFamily="18" charset="0"/>
+                          </a:rPr>
+                          <m:t>×</m:t>
+                        </m:r>
+                        <m:r>
+                          <a:rPr lang="en-US" b="0" i="1" smtClean="0">
+                            <a:latin typeface="Cambria Math" panose="02040503050406030204" pitchFamily="18" charset="0"/>
+                            <a:ea typeface="Cambria Math" panose="02040503050406030204" pitchFamily="18" charset="0"/>
+                          </a:rPr>
+                          <m:t>𝐵</m:t>
+                        </m:r>
+                      </m:oMath>
+                    </m:oMathPara>
+                  </a14:m>
+                  <a:endParaRPr lang="en-US" dirty="0"/>
+                </a:p>
+              </p:txBody>
+            </p:sp>
+          </mc:Choice>
+          <mc:Fallback>
+            <p:sp>
+              <p:nvSpPr>
+                <p:cNvPr id="28" name="TextBox 27"/>
+                <p:cNvSpPr txBox="1">
+                  <a:spLocks noRot="1" noChangeAspect="1" noMove="1" noResize="1" noEditPoints="1" noAdjustHandles="1" noChangeArrowheads="1" noChangeShapeType="1" noTextEdit="1"/>
+                </p:cNvSpPr>
+                <p:nvPr/>
+              </p:nvSpPr>
+              <p:spPr>
+                <a:xfrm>
+                  <a:off x="5118776" y="3932166"/>
+                  <a:ext cx="2577629" cy="276999"/>
+                </a:xfrm>
+                <a:prstGeom prst="rect">
+                  <a:avLst/>
+                </a:prstGeom>
+                <a:blipFill>
+                  <a:blip r:embed="rId3"/>
+                  <a:stretch>
+                    <a:fillRect l="-1891" t="-2222" r="-1418" b="-35556"/>
+                  </a:stretch>
+                </a:blipFill>
+              </p:spPr>
+              <p:txBody>
+                <a:bodyPr/>
+                <a:lstStyle/>
+                <a:p>
+                  <a:r>
+                    <a:rPr lang="en-US">
+                      <a:noFill/>
+                    </a:rPr>
+                    <a:t> </a:t>
+                  </a:r>
+                </a:p>
+              </p:txBody>
+            </p:sp>
+          </mc:Fallback>
+        </mc:AlternateContent>
+        <mc:AlternateContent xmlns:mc="http://schemas.openxmlformats.org/markup-compatibility/2006">
+          <mc:Choice xmlns:a14="http://schemas.microsoft.com/office/drawing/2010/main" Requires="a14">
+            <p:sp>
+              <p:nvSpPr>
+                <p:cNvPr id="29" name="TextBox 28"/>
+                <p:cNvSpPr txBox="1"/>
+                <p:nvPr/>
+              </p:nvSpPr>
+              <p:spPr>
+                <a:xfrm>
+                  <a:off x="5118775" y="4680078"/>
+                  <a:ext cx="1966629" cy="276999"/>
+                </a:xfrm>
+                <a:prstGeom prst="rect">
+                  <a:avLst/>
+                </a:prstGeom>
+                <a:noFill/>
+              </p:spPr>
+              <p:txBody>
+                <a:bodyPr wrap="none" lIns="0" tIns="0" rIns="0" bIns="0" rtlCol="0">
+                  <a:spAutoFit/>
+                </a:bodyPr>
+                <a:lstStyle/>
+                <a:p>
+                  <a:pPr/>
+                  <a14:m>
+                    <m:oMathPara xmlns:m="http://schemas.openxmlformats.org/officeDocument/2006/math">
+                      <m:oMathParaPr>
+                        <m:jc m:val="centerGroup"/>
+                      </m:oMathParaPr>
+                      <m:oMath xmlns:m="http://schemas.openxmlformats.org/officeDocument/2006/math">
+                        <m:sSup>
+                          <m:sSupPr>
+                            <m:ctrlPr>
+                              <a:rPr lang="en-US" b="0" i="1" smtClean="0">
+                                <a:latin typeface="Cambria Math" panose="02040503050406030204" pitchFamily="18" charset="0"/>
+                              </a:rPr>
+                            </m:ctrlPr>
+                          </m:sSupPr>
+                          <m:e>
+                            <m:r>
+                              <a:rPr lang="en-US" b="0" i="1" smtClean="0">
+                                <a:latin typeface="Cambria Math" panose="02040503050406030204" pitchFamily="18" charset="0"/>
+                              </a:rPr>
+                              <m:t>𝐶</m:t>
+                            </m:r>
+                          </m:e>
+                          <m:sup>
+                            <m:r>
+                              <a:rPr lang="en-US" b="0" i="1" smtClean="0">
+                                <a:latin typeface="Cambria Math" panose="02040503050406030204" pitchFamily="18" charset="0"/>
+                              </a:rPr>
+                              <m:t>′</m:t>
+                            </m:r>
+                          </m:sup>
+                        </m:sSup>
+                        <m:r>
+                          <a:rPr lang="en-US" i="1" smtClean="0">
+                            <a:latin typeface="Cambria Math" panose="02040503050406030204" pitchFamily="18" charset="0"/>
+                          </a:rPr>
+                          <m:t>=</m:t>
+                        </m:r>
+                        <m:r>
+                          <a:rPr lang="en-US" b="0" i="1" smtClean="0">
+                            <a:latin typeface="Cambria Math" panose="02040503050406030204" pitchFamily="18" charset="0"/>
+                            <a:ea typeface="Cambria Math" panose="02040503050406030204" pitchFamily="18" charset="0"/>
+                          </a:rPr>
+                          <m:t>𝛽</m:t>
+                        </m:r>
+                        <m:r>
+                          <a:rPr lang="en-US" b="0" i="1" smtClean="0">
+                            <a:latin typeface="Cambria Math" panose="02040503050406030204" pitchFamily="18" charset="0"/>
+                            <a:ea typeface="Cambria Math" panose="02040503050406030204" pitchFamily="18" charset="0"/>
+                          </a:rPr>
+                          <m:t>×</m:t>
+                        </m:r>
+                        <m:r>
+                          <a:rPr lang="en-US" b="0" i="1" smtClean="0">
+                            <a:latin typeface="Cambria Math" panose="02040503050406030204" pitchFamily="18" charset="0"/>
+                            <a:ea typeface="Cambria Math" panose="02040503050406030204" pitchFamily="18" charset="0"/>
+                          </a:rPr>
+                          <m:t>𝐵</m:t>
+                        </m:r>
+                        <m:r>
+                          <a:rPr lang="en-US" b="0" i="1" smtClean="0">
+                            <a:latin typeface="Cambria Math" panose="02040503050406030204" pitchFamily="18" charset="0"/>
+                            <a:ea typeface="Cambria Math" panose="02040503050406030204" pitchFamily="18" charset="0"/>
+                          </a:rPr>
+                          <m:t>−</m:t>
+                        </m:r>
+                        <m:r>
+                          <a:rPr lang="en-US" b="0" i="1" smtClean="0">
+                            <a:latin typeface="Cambria Math" panose="02040503050406030204" pitchFamily="18" charset="0"/>
+                            <a:ea typeface="Cambria Math" panose="02040503050406030204" pitchFamily="18" charset="0"/>
+                          </a:rPr>
+                          <m:t>𝛾</m:t>
+                        </m:r>
+                        <m:r>
+                          <a:rPr lang="en-US" b="0" i="1" smtClean="0">
+                            <a:latin typeface="Cambria Math" panose="02040503050406030204" pitchFamily="18" charset="0"/>
+                            <a:ea typeface="Cambria Math" panose="02040503050406030204" pitchFamily="18" charset="0"/>
+                          </a:rPr>
+                          <m:t>×</m:t>
+                        </m:r>
+                        <m:r>
+                          <a:rPr lang="en-US" b="0" i="1" smtClean="0">
+                            <a:latin typeface="Cambria Math" panose="02040503050406030204" pitchFamily="18" charset="0"/>
+                            <a:ea typeface="Cambria Math" panose="02040503050406030204" pitchFamily="18" charset="0"/>
+                          </a:rPr>
+                          <m:t>𝐶</m:t>
+                        </m:r>
+                      </m:oMath>
+                    </m:oMathPara>
+                  </a14:m>
+                  <a:endParaRPr lang="en-US" dirty="0"/>
+                </a:p>
+              </p:txBody>
+            </p:sp>
+          </mc:Choice>
+          <mc:Fallback>
+            <p:sp>
+              <p:nvSpPr>
+                <p:cNvPr id="29" name="TextBox 28"/>
+                <p:cNvSpPr txBox="1">
+                  <a:spLocks noRot="1" noChangeAspect="1" noMove="1" noResize="1" noEditPoints="1" noAdjustHandles="1" noChangeArrowheads="1" noChangeShapeType="1" noTextEdit="1"/>
+                </p:cNvSpPr>
+                <p:nvPr/>
+              </p:nvSpPr>
+              <p:spPr>
+                <a:xfrm>
+                  <a:off x="5118775" y="4680078"/>
+                  <a:ext cx="1966629" cy="276999"/>
+                </a:xfrm>
+                <a:prstGeom prst="rect">
+                  <a:avLst/>
+                </a:prstGeom>
+                <a:blipFill>
+                  <a:blip r:embed="rId4"/>
+                  <a:stretch>
+                    <a:fillRect l="-2484" t="-4444" r="-2174" b="-35556"/>
+                  </a:stretch>
+                </a:blipFill>
+              </p:spPr>
+              <p:txBody>
+                <a:bodyPr/>
+                <a:lstStyle/>
+                <a:p>
+                  <a:r>
+                    <a:rPr lang="en-US">
+                      <a:noFill/>
+                    </a:rPr>
+                    <a:t> </a:t>
+                  </a:r>
+                </a:p>
+              </p:txBody>
+            </p:sp>
+          </mc:Fallback>
+        </mc:AlternateContent>
+        <mc:AlternateContent xmlns:mc="http://schemas.openxmlformats.org/markup-compatibility/2006">
+          <mc:Choice xmlns:a14="http://schemas.microsoft.com/office/drawing/2010/main" Requires="a14">
+            <p:sp>
+              <p:nvSpPr>
+                <p:cNvPr id="30" name="TextBox 29"/>
+                <p:cNvSpPr txBox="1"/>
+                <p:nvPr/>
+              </p:nvSpPr>
+              <p:spPr>
+                <a:xfrm>
+                  <a:off x="5118775" y="5289490"/>
+                  <a:ext cx="1872757" cy="276999"/>
+                </a:xfrm>
+                <a:prstGeom prst="rect">
+                  <a:avLst/>
+                </a:prstGeom>
+                <a:noFill/>
+              </p:spPr>
+              <p:txBody>
+                <a:bodyPr wrap="none" lIns="0" tIns="0" rIns="0" bIns="0" rtlCol="0">
+                  <a:spAutoFit/>
+                </a:bodyPr>
+                <a:lstStyle/>
+                <a:p>
+                  <a14:m>
                     <m:oMath xmlns:m="http://schemas.openxmlformats.org/officeDocument/2006/math">
                       <m:sSup>
                         <m:sSupPr>
@@ -3548,157 +3863,7 @@
                             <a:rPr lang="en-US" b="0" i="1" smtClean="0">
                               <a:latin typeface="Cambria Math" panose="02040503050406030204" pitchFamily="18" charset="0"/>
                             </a:rPr>
-                            <m:t>𝐵</m:t>
-                          </m:r>
-                        </m:e>
-                        <m:sup>
-                          <m:r>
-                            <a:rPr lang="en-US" b="0" i="1" smtClean="0">
-                              <a:latin typeface="Cambria Math" panose="02040503050406030204" pitchFamily="18" charset="0"/>
-                            </a:rPr>
-                            <m:t>′</m:t>
-                          </m:r>
-                        </m:sup>
-                      </m:sSup>
-                      <m:r>
-                        <a:rPr lang="en-US" i="1" smtClean="0">
-                          <a:latin typeface="Cambria Math" panose="02040503050406030204" pitchFamily="18" charset="0"/>
-                        </a:rPr>
-                        <m:t>=</m:t>
-                      </m:r>
-                      <m:r>
-                        <a:rPr lang="en-US" b="0" i="1" smtClean="0">
-                          <a:latin typeface="Cambria Math" panose="02040503050406030204" pitchFamily="18" charset="0"/>
-                          <a:ea typeface="Cambria Math" panose="02040503050406030204" pitchFamily="18" charset="0"/>
-                        </a:rPr>
-                        <m:t>−</m:t>
-                      </m:r>
-                      <m:r>
-                        <a:rPr lang="en-US" b="0" i="1" smtClean="0">
-                          <a:latin typeface="Cambria Math" panose="02040503050406030204" pitchFamily="18" charset="0"/>
-                          <a:ea typeface="Cambria Math" panose="02040503050406030204" pitchFamily="18" charset="0"/>
-                        </a:rPr>
-                        <m:t>𝛽</m:t>
-                      </m:r>
-                      <m:r>
-                        <a:rPr lang="en-US" b="0" i="1" smtClean="0">
-                          <a:latin typeface="Cambria Math" panose="02040503050406030204" pitchFamily="18" charset="0"/>
-                          <a:ea typeface="Cambria Math" panose="02040503050406030204" pitchFamily="18" charset="0"/>
-                        </a:rPr>
-                        <m:t>×</m:t>
-                      </m:r>
-                      <m:r>
-                        <a:rPr lang="en-US" b="0" i="1" smtClean="0">
-                          <a:latin typeface="Cambria Math" panose="02040503050406030204" pitchFamily="18" charset="0"/>
-                          <a:ea typeface="Cambria Math" panose="02040503050406030204" pitchFamily="18" charset="0"/>
-                        </a:rPr>
-                        <m:t>𝐴</m:t>
-                      </m:r>
-                      <m:r>
-                        <a:rPr lang="en-US" b="0" i="1" smtClean="0">
-                          <a:latin typeface="Cambria Math" panose="02040503050406030204" pitchFamily="18" charset="0"/>
-                          <a:ea typeface="Cambria Math" panose="02040503050406030204" pitchFamily="18" charset="0"/>
-                        </a:rPr>
-                        <m:t>×</m:t>
-                      </m:r>
-                      <m:r>
-                        <a:rPr lang="en-US" b="0" i="1" smtClean="0">
-                          <a:latin typeface="Cambria Math" panose="02040503050406030204" pitchFamily="18" charset="0"/>
-                          <a:ea typeface="Cambria Math" panose="02040503050406030204" pitchFamily="18" charset="0"/>
-                        </a:rPr>
-                        <m:t>𝐵</m:t>
-                      </m:r>
-                    </m:oMath>
-                  </m:oMathPara>
-                </a14:m>
-                <a:endParaRPr lang="en-US" dirty="0"/>
-              </a:p>
-            </p:txBody>
-          </p:sp>
-        </mc:Choice>
-        <mc:Fallback>
-          <p:sp>
-            <p:nvSpPr>
-              <p:cNvPr id="28" name="TextBox 27"/>
-              <p:cNvSpPr txBox="1">
-                <a:spLocks noRot="1" noChangeAspect="1" noMove="1" noResize="1" noEditPoints="1" noAdjustHandles="1" noChangeArrowheads="1" noChangeShapeType="1" noTextEdit="1"/>
-              </p:cNvSpPr>
-              <p:nvPr/>
-            </p:nvSpPr>
-            <p:spPr>
-              <a:xfrm>
-                <a:off x="4278051" y="3504596"/>
-                <a:ext cx="1743233" cy="276999"/>
-              </a:xfrm>
-              <a:prstGeom prst="rect">
-                <a:avLst/>
-              </a:prstGeom>
-              <a:blipFill>
-                <a:blip r:embed="rId3"/>
-                <a:stretch>
-                  <a:fillRect l="-2797" t="-2222" r="-2448" b="-35556"/>
-                </a:stretch>
-              </a:blipFill>
-            </p:spPr>
-            <p:txBody>
-              <a:bodyPr/>
-              <a:lstStyle/>
-              <a:p>
-                <a:r>
-                  <a:rPr lang="en-US">
-                    <a:noFill/>
-                  </a:rPr>
-                  <a:t> </a:t>
-                </a:r>
-              </a:p>
-            </p:txBody>
-          </p:sp>
-        </mc:Fallback>
-      </mc:AlternateContent>
-      <mc:AlternateContent xmlns:mc="http://schemas.openxmlformats.org/markup-compatibility/2006">
-        <mc:Choice xmlns:a14="http://schemas.microsoft.com/office/drawing/2010/main" Requires="a14">
-          <p:sp>
-            <p:nvSpPr>
-              <p:cNvPr id="29" name="TextBox 28"/>
-              <p:cNvSpPr txBox="1"/>
-              <p:nvPr/>
-            </p:nvSpPr>
-            <p:spPr>
-              <a:xfrm>
-                <a:off x="4278050" y="4252508"/>
-                <a:ext cx="1966629" cy="276999"/>
-              </a:xfrm>
-              <a:prstGeom prst="rect">
-                <a:avLst/>
-              </a:prstGeom>
-              <a:noFill/>
-            </p:spPr>
-            <p:txBody>
-              <a:bodyPr wrap="none" lIns="0" tIns="0" rIns="0" bIns="0" rtlCol="0">
-                <a:spAutoFit/>
-              </a:bodyPr>
-              <a:lstStyle/>
-              <a:p>
-                <a14:m>
-                  <m:oMathPara xmlns:m="http://schemas.openxmlformats.org/officeDocument/2006/math">
-                    <m:oMathParaPr>
-                      <m:jc m:val="centerGroup"/>
-                    </m:oMathParaPr>
-                    <m:oMath xmlns:m="http://schemas.openxmlformats.org/officeDocument/2006/math">
-                      <m:sSup>
-                        <m:sSupPr>
-                          <m:ctrlPr>
-                            <a:rPr lang="en-US" b="0" i="1" smtClean="0">
-                              <a:latin typeface="Cambria Math" panose="02040503050406030204" pitchFamily="18" charset="0"/>
-                            </a:rPr>
-                          </m:ctrlPr>
-                        </m:sSupPr>
-                        <m:e>
-                          <m:r>
-                            <a:rPr lang="en-US" b="0" i="1" smtClean="0">
-                              <a:latin typeface="Cambria Math" panose="02040503050406030204" pitchFamily="18" charset="0"/>
-                            </a:rPr>
-                            <m:t>𝐶</m:t>
+                            <m:t>𝐷</m:t>
                           </m:r>
                         </m:e>
                         <m:sup>
@@ -3758,209 +3923,131 @@
                         </a:rPr>
                         <m:t>×</m:t>
                       </m:r>
-                      <m:r>
-                        <a:rPr lang="en-US" b="0" i="1" smtClean="0">
-                          <a:latin typeface="Cambria Math" panose="02040503050406030204" pitchFamily="18" charset="0"/>
-                          <a:ea typeface="Cambria Math" panose="02040503050406030204" pitchFamily="18" charset="0"/>
-                        </a:rPr>
-                        <m:t>𝐶</m:t>
-                      </m:r>
                     </m:oMath>
-                  </m:oMathPara>
-                </a14:m>
-                <a:endParaRPr lang="en-US" dirty="0"/>
-              </a:p>
-            </p:txBody>
-          </p:sp>
-        </mc:Choice>
-        <mc:Fallback>
-          <p:sp>
-            <p:nvSpPr>
-              <p:cNvPr id="29" name="TextBox 28"/>
-              <p:cNvSpPr txBox="1">
-                <a:spLocks noRot="1" noChangeAspect="1" noMove="1" noResize="1" noEditPoints="1" noAdjustHandles="1" noChangeArrowheads="1" noChangeShapeType="1" noTextEdit="1"/>
-              </p:cNvSpPr>
-              <p:nvPr/>
-            </p:nvSpPr>
-            <p:spPr>
-              <a:xfrm>
-                <a:off x="4278050" y="4252508"/>
-                <a:ext cx="1966629" cy="276999"/>
-              </a:xfrm>
-              <a:prstGeom prst="rect">
-                <a:avLst/>
-              </a:prstGeom>
-              <a:blipFill>
-                <a:blip r:embed="rId4"/>
-                <a:stretch>
-                  <a:fillRect l="-2484" t="-4444" r="-2174" b="-35556"/>
-                </a:stretch>
-              </a:blipFill>
-            </p:spPr>
-            <p:txBody>
-              <a:bodyPr/>
-              <a:lstStyle/>
-              <a:p>
-                <a:r>
-                  <a:rPr lang="en-US">
-                    <a:noFill/>
-                  </a:rPr>
-                  <a:t> </a:t>
-                </a:r>
-              </a:p>
-            </p:txBody>
-          </p:sp>
-        </mc:Fallback>
-      </mc:AlternateContent>
-      <mc:AlternateContent xmlns:mc="http://schemas.openxmlformats.org/markup-compatibility/2006">
-        <mc:Choice xmlns:a14="http://schemas.microsoft.com/office/drawing/2010/main" Requires="a14">
-          <p:sp>
-            <p:nvSpPr>
-              <p:cNvPr id="30" name="TextBox 29"/>
-              <p:cNvSpPr txBox="1"/>
-              <p:nvPr/>
-            </p:nvSpPr>
-            <p:spPr>
-              <a:xfrm>
-                <a:off x="4278050" y="4861920"/>
-                <a:ext cx="1872757" cy="276999"/>
-              </a:xfrm>
-              <a:prstGeom prst="rect">
-                <a:avLst/>
-              </a:prstGeom>
-              <a:noFill/>
-            </p:spPr>
-            <p:txBody>
-              <a:bodyPr wrap="none" lIns="0" tIns="0" rIns="0" bIns="0" rtlCol="0">
-                <a:spAutoFit/>
-              </a:bodyPr>
-              <a:lstStyle/>
-              <a:p>
-                <a14:m>
-                  <m:oMath xmlns:m="http://schemas.openxmlformats.org/officeDocument/2006/math">
-                    <m:sSup>
-                      <m:sSupPr>
-                        <m:ctrlPr>
-                          <a:rPr lang="en-US" b="0" i="1" smtClean="0">
-                            <a:latin typeface="Cambria Math" panose="02040503050406030204" pitchFamily="18" charset="0"/>
-                          </a:rPr>
-                        </m:ctrlPr>
-                      </m:sSupPr>
-                      <m:e>
-                        <m:r>
-                          <a:rPr lang="en-US" b="0" i="1" smtClean="0">
-                            <a:latin typeface="Cambria Math" panose="02040503050406030204" pitchFamily="18" charset="0"/>
-                          </a:rPr>
-                          <m:t>𝐷</m:t>
-                        </m:r>
-                      </m:e>
-                      <m:sup>
-                        <m:r>
-                          <a:rPr lang="en-US" b="0" i="1" smtClean="0">
-                            <a:latin typeface="Cambria Math" panose="02040503050406030204" pitchFamily="18" charset="0"/>
-                          </a:rPr>
-                          <m:t>′</m:t>
-                        </m:r>
-                      </m:sup>
-                    </m:sSup>
-                    <m:r>
-                      <a:rPr lang="en-US" i="1" smtClean="0">
-                        <a:latin typeface="Cambria Math" panose="02040503050406030204" pitchFamily="18" charset="0"/>
-                      </a:rPr>
-                      <m:t>=</m:t>
-                    </m:r>
-                    <m:r>
-                      <a:rPr lang="en-US" b="0" i="1" smtClean="0">
-                        <a:latin typeface="Cambria Math" panose="02040503050406030204" pitchFamily="18" charset="0"/>
-                        <a:ea typeface="Cambria Math" panose="02040503050406030204" pitchFamily="18" charset="0"/>
-                      </a:rPr>
-                      <m:t>𝛽</m:t>
-                    </m:r>
-                    <m:r>
-                      <a:rPr lang="en-US" b="0" i="1" smtClean="0">
-                        <a:latin typeface="Cambria Math" panose="02040503050406030204" pitchFamily="18" charset="0"/>
-                        <a:ea typeface="Cambria Math" panose="02040503050406030204" pitchFamily="18" charset="0"/>
-                      </a:rPr>
-                      <m:t>×</m:t>
-                    </m:r>
-                    <m:r>
-                      <a:rPr lang="en-US" b="0" i="1" smtClean="0">
-                        <a:latin typeface="Cambria Math" panose="02040503050406030204" pitchFamily="18" charset="0"/>
-                        <a:ea typeface="Cambria Math" panose="02040503050406030204" pitchFamily="18" charset="0"/>
-                      </a:rPr>
-                      <m:t>𝐵</m:t>
-                    </m:r>
-                    <m:r>
-                      <a:rPr lang="en-US" b="0" i="1" smtClean="0">
-                        <a:latin typeface="Cambria Math" panose="02040503050406030204" pitchFamily="18" charset="0"/>
-                        <a:ea typeface="Cambria Math" panose="02040503050406030204" pitchFamily="18" charset="0"/>
-                      </a:rPr>
-                      <m:t>−</m:t>
-                    </m:r>
-                    <m:r>
-                      <a:rPr lang="en-US" b="0" i="1" smtClean="0">
-                        <a:latin typeface="Cambria Math" panose="02040503050406030204" pitchFamily="18" charset="0"/>
-                        <a:ea typeface="Cambria Math" panose="02040503050406030204" pitchFamily="18" charset="0"/>
-                      </a:rPr>
-                      <m:t>𝛾</m:t>
-                    </m:r>
-                    <m:r>
-                      <a:rPr lang="en-US" b="0" i="1" smtClean="0">
-                        <a:latin typeface="Cambria Math" panose="02040503050406030204" pitchFamily="18" charset="0"/>
-                        <a:ea typeface="Cambria Math" panose="02040503050406030204" pitchFamily="18" charset="0"/>
-                      </a:rPr>
-                      <m:t>×</m:t>
-                    </m:r>
-                  </m:oMath>
-                </a14:m>
-                <a:r>
-                  <a:rPr lang="en-US" dirty="0" smtClean="0"/>
-                  <a:t>D</a:t>
-                </a:r>
-                <a:endParaRPr lang="en-US" dirty="0"/>
-              </a:p>
-            </p:txBody>
-          </p:sp>
-        </mc:Choice>
-        <mc:Fallback>
-          <p:sp>
-            <p:nvSpPr>
-              <p:cNvPr id="30" name="TextBox 29"/>
-              <p:cNvSpPr txBox="1">
-                <a:spLocks noRot="1" noChangeAspect="1" noMove="1" noResize="1" noEditPoints="1" noAdjustHandles="1" noChangeArrowheads="1" noChangeShapeType="1" noTextEdit="1"/>
-              </p:cNvSpPr>
-              <p:nvPr/>
-            </p:nvSpPr>
-            <p:spPr>
-              <a:xfrm>
-                <a:off x="4278050" y="4861920"/>
-                <a:ext cx="1872757" cy="276999"/>
-              </a:xfrm>
-              <a:prstGeom prst="rect">
-                <a:avLst/>
-              </a:prstGeom>
-              <a:blipFill>
-                <a:blip r:embed="rId5"/>
-                <a:stretch>
-                  <a:fillRect l="-4560" t="-28889" r="-6515" b="-51111"/>
-                </a:stretch>
-              </a:blipFill>
-            </p:spPr>
-            <p:txBody>
-              <a:bodyPr/>
-              <a:lstStyle/>
-              <a:p>
-                <a:r>
-                  <a:rPr lang="en-US">
-                    <a:noFill/>
-                  </a:rPr>
-                  <a:t> </a:t>
-                </a:r>
-              </a:p>
-            </p:txBody>
-          </p:sp>
-        </mc:Fallback>
-      </mc:AlternateContent>
+                  </a14:m>
+                  <a:r>
+                    <a:rPr lang="en-US" dirty="0" smtClean="0"/>
+                    <a:t>D</a:t>
+                  </a:r>
+                  <a:endParaRPr lang="en-US" dirty="0"/>
+                </a:p>
+              </p:txBody>
+            </p:sp>
+          </mc:Choice>
+          <mc:Fallback>
+            <p:sp>
+              <p:nvSpPr>
+                <p:cNvPr id="30" name="TextBox 29"/>
+                <p:cNvSpPr txBox="1">
+                  <a:spLocks noRot="1" noChangeAspect="1" noMove="1" noResize="1" noEditPoints="1" noAdjustHandles="1" noChangeArrowheads="1" noChangeShapeType="1" noTextEdit="1"/>
+                </p:cNvSpPr>
+                <p:nvPr/>
+              </p:nvSpPr>
+              <p:spPr>
+                <a:xfrm>
+                  <a:off x="5118775" y="5289490"/>
+                  <a:ext cx="1872757" cy="276999"/>
+                </a:xfrm>
+                <a:prstGeom prst="rect">
+                  <a:avLst/>
+                </a:prstGeom>
+                <a:blipFill>
+                  <a:blip r:embed="rId5"/>
+                  <a:stretch>
+                    <a:fillRect l="-4560" t="-28889" r="-6515" b="-51111"/>
+                  </a:stretch>
+                </a:blipFill>
+              </p:spPr>
+              <p:txBody>
+                <a:bodyPr/>
+                <a:lstStyle/>
+                <a:p>
+                  <a:r>
+                    <a:rPr lang="en-US">
+                      <a:noFill/>
+                    </a:rPr>
+                    <a:t> </a:t>
+                  </a:r>
+                </a:p>
+              </p:txBody>
+            </p:sp>
+          </mc:Fallback>
+        </mc:AlternateContent>
+        <p:cxnSp>
+          <p:nvCxnSpPr>
+            <p:cNvPr id="17" name="Elbow Connector 16"/>
+            <p:cNvCxnSpPr>
+              <a:stCxn id="4" idx="5"/>
+              <a:endCxn id="5" idx="3"/>
+            </p:cNvCxnSpPr>
+            <p:nvPr/>
+          </p:nvCxnSpPr>
+          <p:spPr>
+            <a:xfrm rot="16200000" flipH="1">
+              <a:off x="2906810" y="2119157"/>
+              <a:ext cx="42115" cy="1928975"/>
+            </a:xfrm>
+            <a:prstGeom prst="bentConnector3">
+              <a:avLst>
+                <a:gd name="adj1" fmla="val 1946038"/>
+              </a:avLst>
+            </a:prstGeom>
+            <a:ln w="101600">
+              <a:tailEnd type="triangle"/>
+            </a:ln>
+          </p:spPr>
+          <p:style>
+            <a:lnRef idx="3">
+              <a:schemeClr val="accent5"/>
+            </a:lnRef>
+            <a:fillRef idx="0">
+              <a:schemeClr val="accent5"/>
+            </a:fillRef>
+            <a:effectRef idx="2">
+              <a:schemeClr val="accent5"/>
+            </a:effectRef>
+            <a:fontRef idx="minor">
+              <a:schemeClr val="tx1"/>
+            </a:fontRef>
+          </p:style>
+        </p:cxnSp>
+        <p:cxnSp>
+          <p:nvCxnSpPr>
+            <p:cNvPr id="11" name="Straight Arrow Connector 10"/>
+            <p:cNvCxnSpPr>
+              <a:stCxn id="5" idx="4"/>
+              <a:endCxn id="16" idx="0"/>
+            </p:cNvCxnSpPr>
+            <p:nvPr/>
+          </p:nvCxnSpPr>
+          <p:spPr>
+            <a:xfrm>
+              <a:off x="4156091" y="3213946"/>
+              <a:ext cx="5589" cy="1979564"/>
+            </a:xfrm>
+            <a:prstGeom prst="straightConnector1">
+              <a:avLst/>
+            </a:prstGeom>
+            <a:ln w="101600">
+              <a:tailEnd type="triangle"/>
+            </a:ln>
+          </p:spPr>
+          <p:style>
+            <a:lnRef idx="1">
+              <a:schemeClr val="accent1"/>
+            </a:lnRef>
+            <a:fillRef idx="0">
+              <a:schemeClr val="accent1"/>
+            </a:fillRef>
+            <a:effectRef idx="0">
+              <a:schemeClr val="accent1"/>
+            </a:effectRef>
+            <a:fontRef idx="minor">
+              <a:schemeClr val="tx1"/>
+            </a:fontRef>
+          </p:style>
+        </p:cxnSp>
+      </p:grpSp>
     </p:spTree>
     <p:extLst>
       <p:ext uri="{BB962C8B-B14F-4D97-AF65-F5344CB8AC3E}">

</xml_diff>